<commit_message>
docs: more changes in readme
</commit_message>
<xml_diff>
--- a/Apresentação de Teste de SQL .pptx
+++ b/Apresentação de Teste de SQL .pptx
@@ -11,11 +11,10 @@
     <p:sldId id="259" r:id="rId5"/>
     <p:sldId id="260" r:id="rId6"/>
     <p:sldId id="261" r:id="rId7"/>
-    <p:sldId id="267" r:id="rId8"/>
-    <p:sldId id="262" r:id="rId9"/>
-    <p:sldId id="263" r:id="rId10"/>
-    <p:sldId id="266" r:id="rId11"/>
-    <p:sldId id="265" r:id="rId12"/>
+    <p:sldId id="262" r:id="rId8"/>
+    <p:sldId id="263" r:id="rId9"/>
+    <p:sldId id="266" r:id="rId10"/>
+    <p:sldId id="265" r:id="rId11"/>
   </p:sldIdLst>
   <p:sldSz cx="12192000" cy="6858000"/>
   <p:notesSz cx="6858000" cy="9144000"/>
@@ -253,7 +252,7 @@
           <a:p>
             <a:fld id="{23F05D85-4FE8-437A-8311-E80EE564AEB2}" type="datetimeFigureOut">
               <a:rPr lang="pt-BR" smtClean="0"/>
-              <a:t>24/06/2024</a:t>
+              <a:t>25/06/2024</a:t>
             </a:fld>
             <a:endParaRPr lang="pt-BR"/>
           </a:p>
@@ -423,7 +422,7 @@
           <a:p>
             <a:fld id="{23F05D85-4FE8-437A-8311-E80EE564AEB2}" type="datetimeFigureOut">
               <a:rPr lang="pt-BR" smtClean="0"/>
-              <a:t>24/06/2024</a:t>
+              <a:t>25/06/2024</a:t>
             </a:fld>
             <a:endParaRPr lang="pt-BR"/>
           </a:p>
@@ -603,7 +602,7 @@
           <a:p>
             <a:fld id="{23F05D85-4FE8-437A-8311-E80EE564AEB2}" type="datetimeFigureOut">
               <a:rPr lang="pt-BR" smtClean="0"/>
-              <a:t>24/06/2024</a:t>
+              <a:t>25/06/2024</a:t>
             </a:fld>
             <a:endParaRPr lang="pt-BR"/>
           </a:p>
@@ -773,7 +772,7 @@
           <a:p>
             <a:fld id="{23F05D85-4FE8-437A-8311-E80EE564AEB2}" type="datetimeFigureOut">
               <a:rPr lang="pt-BR" smtClean="0"/>
-              <a:t>24/06/2024</a:t>
+              <a:t>25/06/2024</a:t>
             </a:fld>
             <a:endParaRPr lang="pt-BR"/>
           </a:p>
@@ -1019,7 +1018,7 @@
           <a:p>
             <a:fld id="{23F05D85-4FE8-437A-8311-E80EE564AEB2}" type="datetimeFigureOut">
               <a:rPr lang="pt-BR" smtClean="0"/>
-              <a:t>24/06/2024</a:t>
+              <a:t>25/06/2024</a:t>
             </a:fld>
             <a:endParaRPr lang="pt-BR"/>
           </a:p>
@@ -1251,7 +1250,7 @@
           <a:p>
             <a:fld id="{23F05D85-4FE8-437A-8311-E80EE564AEB2}" type="datetimeFigureOut">
               <a:rPr lang="pt-BR" smtClean="0"/>
-              <a:t>24/06/2024</a:t>
+              <a:t>25/06/2024</a:t>
             </a:fld>
             <a:endParaRPr lang="pt-BR"/>
           </a:p>
@@ -1618,7 +1617,7 @@
           <a:p>
             <a:fld id="{23F05D85-4FE8-437A-8311-E80EE564AEB2}" type="datetimeFigureOut">
               <a:rPr lang="pt-BR" smtClean="0"/>
-              <a:t>24/06/2024</a:t>
+              <a:t>25/06/2024</a:t>
             </a:fld>
             <a:endParaRPr lang="pt-BR"/>
           </a:p>
@@ -1736,7 +1735,7 @@
           <a:p>
             <a:fld id="{23F05D85-4FE8-437A-8311-E80EE564AEB2}" type="datetimeFigureOut">
               <a:rPr lang="pt-BR" smtClean="0"/>
-              <a:t>24/06/2024</a:t>
+              <a:t>25/06/2024</a:t>
             </a:fld>
             <a:endParaRPr lang="pt-BR"/>
           </a:p>
@@ -1831,7 +1830,7 @@
           <a:p>
             <a:fld id="{23F05D85-4FE8-437A-8311-E80EE564AEB2}" type="datetimeFigureOut">
               <a:rPr lang="pt-BR" smtClean="0"/>
-              <a:t>24/06/2024</a:t>
+              <a:t>25/06/2024</a:t>
             </a:fld>
             <a:endParaRPr lang="pt-BR"/>
           </a:p>
@@ -2108,7 +2107,7 @@
           <a:p>
             <a:fld id="{23F05D85-4FE8-437A-8311-E80EE564AEB2}" type="datetimeFigureOut">
               <a:rPr lang="pt-BR" smtClean="0"/>
-              <a:t>24/06/2024</a:t>
+              <a:t>25/06/2024</a:t>
             </a:fld>
             <a:endParaRPr lang="pt-BR"/>
           </a:p>
@@ -2361,7 +2360,7 @@
           <a:p>
             <a:fld id="{23F05D85-4FE8-437A-8311-E80EE564AEB2}" type="datetimeFigureOut">
               <a:rPr lang="pt-BR" smtClean="0"/>
-              <a:t>24/06/2024</a:t>
+              <a:t>25/06/2024</a:t>
             </a:fld>
             <a:endParaRPr lang="pt-BR"/>
           </a:p>
@@ -2574,7 +2573,7 @@
           <a:p>
             <a:fld id="{23F05D85-4FE8-437A-8311-E80EE564AEB2}" type="datetimeFigureOut">
               <a:rPr lang="pt-BR" smtClean="0"/>
-              <a:t>24/06/2024</a:t>
+              <a:t>25/06/2024</a:t>
             </a:fld>
             <a:endParaRPr lang="pt-BR"/>
           </a:p>
@@ -3153,736 +3152,6 @@
         </p:nvSpPr>
         <p:spPr>
           <a:xfrm>
-            <a:off x="8379" y="10633"/>
-            <a:ext cx="9090838" cy="1263985"/>
-          </a:xfrm>
-        </p:spPr>
-        <p:txBody>
-          <a:bodyPr>
-            <a:normAutofit/>
-          </a:bodyPr>
-          <a:lstStyle/>
-          <a:p>
-            <a:pPr algn="l"/>
-            <a:r>
-              <a:rPr lang="pt-BR" sz="2800" b="1" dirty="0" smtClean="0">
-                <a:solidFill>
-                  <a:srgbClr val="FF0000"/>
-                </a:solidFill>
-              </a:rPr>
-              <a:t>Análise dos Dias com Picos de Acessos Negados</a:t>
-            </a:r>
-            <a:r>
-              <a:rPr lang="pt-BR" sz="2600" b="1" dirty="0" smtClean="0">
-                <a:solidFill>
-                  <a:srgbClr val="FF0000"/>
-                </a:solidFill>
-              </a:rPr>
-              <a:t/>
-            </a:r>
-            <a:br>
-              <a:rPr lang="pt-BR" sz="2600" b="1" dirty="0" smtClean="0">
-                <a:solidFill>
-                  <a:srgbClr val="FF0000"/>
-                </a:solidFill>
-              </a:rPr>
-            </a:br>
-            <a:endParaRPr lang="pt-BR" sz="2600" dirty="0"/>
-          </a:p>
-        </p:txBody>
-      </p:sp>
-      <p:pic>
-        <p:nvPicPr>
-          <p:cNvPr id="1026" name="Picture 2" descr="Ifood Logo (PNG e SVG) Download Vetorial Transparente"/>
-          <p:cNvPicPr>
-            <a:picLocks noChangeAspect="1" noChangeArrowheads="1"/>
-          </p:cNvPicPr>
-          <p:nvPr/>
-        </p:nvPicPr>
-        <p:blipFill>
-          <a:blip r:embed="rId2" cstate="print">
-            <a:extLst>
-              <a:ext uri="{28A0092B-C50C-407E-A947-70E740481C1C}">
-                <a14:useLocalDpi xmlns:a14="http://schemas.microsoft.com/office/drawing/2010/main" val="0"/>
-              </a:ext>
-            </a:extLst>
-          </a:blip>
-          <a:srcRect/>
-          <a:stretch>
-            <a:fillRect/>
-          </a:stretch>
-        </p:blipFill>
-        <p:spPr bwMode="auto">
-          <a:xfrm>
-            <a:off x="10210511" y="317149"/>
-            <a:ext cx="1811920" cy="957469"/>
-          </a:xfrm>
-          <a:prstGeom prst="rect">
-            <a:avLst/>
-          </a:prstGeom>
-          <a:noFill/>
-          <a:extLst>
-            <a:ext uri="{909E8E84-426E-40DD-AFC4-6F175D3DCCD1}">
-              <a14:hiddenFill xmlns:a14="http://schemas.microsoft.com/office/drawing/2010/main">
-                <a:solidFill>
-                  <a:srgbClr val="FFFFFF"/>
-                </a:solidFill>
-              </a14:hiddenFill>
-            </a:ext>
-          </a:extLst>
-        </p:spPr>
-      </p:pic>
-      <p:sp>
-        <p:nvSpPr>
-          <p:cNvPr id="3" name="CaixaDeTexto 2"/>
-          <p:cNvSpPr txBox="1"/>
-          <p:nvPr/>
-        </p:nvSpPr>
-        <p:spPr>
-          <a:xfrm>
-            <a:off x="372255" y="4912242"/>
-            <a:ext cx="11650176" cy="2123658"/>
-          </a:xfrm>
-          <a:prstGeom prst="rect">
-            <a:avLst/>
-          </a:prstGeom>
-          <a:noFill/>
-        </p:spPr>
-        <p:txBody>
-          <a:bodyPr wrap="square" rtlCol="0">
-            <a:spAutoFit/>
-          </a:bodyPr>
-          <a:lstStyle/>
-          <a:p>
-            <a:pPr marL="285750" indent="-285750" algn="just">
-              <a:buFont typeface="Arial" panose="020B0604020202020204" pitchFamily="34" charset="0"/>
-              <a:buChar char="•"/>
-            </a:pPr>
-            <a:r>
-              <a:rPr lang="pt-BR" sz="1600" dirty="0" smtClean="0"/>
-              <a:t>Dos 24 acessos negados nos dias acima da média, 9 são referentes a entregadores da categoria </a:t>
-            </a:r>
-            <a:r>
-              <a:rPr lang="pt-BR" sz="1600" b="1" dirty="0" smtClean="0">
-                <a:solidFill>
-                  <a:srgbClr val="FF0000"/>
-                </a:solidFill>
-              </a:rPr>
-              <a:t>Prata</a:t>
-            </a:r>
-            <a:r>
-              <a:rPr lang="pt-BR" sz="1600" dirty="0" smtClean="0"/>
-              <a:t>, cerca de </a:t>
-            </a:r>
-            <a:r>
-              <a:rPr lang="pt-BR" sz="1600" b="1" dirty="0" smtClean="0">
-                <a:solidFill>
-                  <a:srgbClr val="FF0000"/>
-                </a:solidFill>
-              </a:rPr>
-              <a:t>38%</a:t>
-            </a:r>
-            <a:r>
-              <a:rPr lang="pt-BR" sz="1600" dirty="0" smtClean="0"/>
-              <a:t>. Contudo, mesmo que esses entregadores sejam da categoria Prata, eles não são os mais antigos na plataforma. Os entregadores mais antigos com acessos negados nos dias de análise são das categorias </a:t>
-            </a:r>
-            <a:r>
-              <a:rPr lang="pt-BR" sz="1600" b="1" dirty="0" smtClean="0">
-                <a:solidFill>
-                  <a:srgbClr val="FF0000"/>
-                </a:solidFill>
-              </a:rPr>
-              <a:t>Iniciante </a:t>
-            </a:r>
-            <a:r>
-              <a:rPr lang="pt-BR" sz="1600" dirty="0" smtClean="0"/>
-              <a:t>e</a:t>
-            </a:r>
-            <a:r>
-              <a:rPr lang="pt-BR" sz="1600" b="1" dirty="0" smtClean="0">
-                <a:solidFill>
-                  <a:srgbClr val="FF0000"/>
-                </a:solidFill>
-              </a:rPr>
-              <a:t> Bronze</a:t>
-            </a:r>
-            <a:r>
-              <a:rPr lang="pt-BR" sz="1600" dirty="0"/>
-              <a:t>,</a:t>
-            </a:r>
-            <a:r>
-              <a:rPr lang="pt-BR" sz="1600" dirty="0" smtClean="0"/>
-              <a:t> o que indica que essas contas são usadas com o intuito de fraude.</a:t>
-            </a:r>
-          </a:p>
-          <a:p>
-            <a:pPr marL="285750" indent="-285750" algn="just">
-              <a:buFont typeface="Arial" panose="020B0604020202020204" pitchFamily="34" charset="0"/>
-              <a:buChar char="•"/>
-            </a:pPr>
-            <a:endParaRPr lang="pt-BR" sz="1600" dirty="0"/>
-          </a:p>
-          <a:p>
-            <a:pPr marL="285750" indent="-285750" algn="just">
-              <a:buFont typeface="Arial" panose="020B0604020202020204" pitchFamily="34" charset="0"/>
-              <a:buChar char="•"/>
-            </a:pPr>
-            <a:r>
-              <a:rPr lang="pt-BR" sz="1600" dirty="0" smtClean="0"/>
-              <a:t>Ação: Encaminhar esses usuários para uma análise detalhada no fluxo </a:t>
-            </a:r>
-            <a:r>
-              <a:rPr lang="pt-BR" sz="1600" dirty="0" err="1" smtClean="0"/>
-              <a:t>stack</a:t>
-            </a:r>
-            <a:r>
-              <a:rPr lang="pt-BR" sz="1600" dirty="0" smtClean="0"/>
-              <a:t>.</a:t>
-            </a:r>
-            <a:endParaRPr lang="pt-BR" dirty="0" smtClean="0"/>
-          </a:p>
-          <a:p>
-            <a:pPr marL="742950" lvl="1" indent="-285750">
-              <a:buFont typeface="Arial" panose="020B0604020202020204" pitchFamily="34" charset="0"/>
-              <a:buChar char="•"/>
-            </a:pPr>
-            <a:endParaRPr lang="pt-BR" dirty="0"/>
-          </a:p>
-          <a:p>
-            <a:pPr marL="285750" indent="-285750">
-              <a:buFont typeface="Arial" panose="020B0604020202020204" pitchFamily="34" charset="0"/>
-              <a:buChar char="•"/>
-            </a:pPr>
-            <a:endParaRPr lang="pt-BR" dirty="0"/>
-          </a:p>
-        </p:txBody>
-      </p:sp>
-      <p:pic>
-        <p:nvPicPr>
-          <p:cNvPr id="5" name="Imagem 4"/>
-          <p:cNvPicPr>
-            <a:picLocks noChangeAspect="1"/>
-          </p:cNvPicPr>
-          <p:nvPr/>
-        </p:nvPicPr>
-        <p:blipFill>
-          <a:blip r:embed="rId3"/>
-          <a:stretch>
-            <a:fillRect/>
-          </a:stretch>
-        </p:blipFill>
-        <p:spPr>
-          <a:xfrm>
-            <a:off x="249125" y="1274618"/>
-            <a:ext cx="4756676" cy="3291450"/>
-          </a:xfrm>
-          <a:prstGeom prst="rect">
-            <a:avLst/>
-          </a:prstGeom>
-        </p:spPr>
-      </p:pic>
-      <p:sp>
-        <p:nvSpPr>
-          <p:cNvPr id="8" name="Retângulo de cantos arredondados 7"/>
-          <p:cNvSpPr/>
-          <p:nvPr/>
-        </p:nvSpPr>
-        <p:spPr>
-          <a:xfrm rot="5400000">
-            <a:off x="2914084" y="1814955"/>
-            <a:ext cx="397562" cy="775434"/>
-          </a:xfrm>
-          <a:prstGeom prst="roundRect">
-            <a:avLst/>
-          </a:prstGeom>
-          <a:noFill/>
-          <a:ln w="19050">
-            <a:solidFill>
-              <a:srgbClr val="FF0000"/>
-            </a:solidFill>
-            <a:prstDash val="lgDash"/>
-          </a:ln>
-        </p:spPr>
-        <p:style>
-          <a:lnRef idx="2">
-            <a:schemeClr val="accent1">
-              <a:shade val="50000"/>
-            </a:schemeClr>
-          </a:lnRef>
-          <a:fillRef idx="1">
-            <a:schemeClr val="accent1"/>
-          </a:fillRef>
-          <a:effectRef idx="0">
-            <a:schemeClr val="accent1"/>
-          </a:effectRef>
-          <a:fontRef idx="minor">
-            <a:schemeClr val="lt1"/>
-          </a:fontRef>
-        </p:style>
-        <p:txBody>
-          <a:bodyPr rot="0" spcFirstLastPara="0" vert="horz" wrap="square" lIns="91440" tIns="45720" rIns="91440" bIns="45720" numCol="1" spcCol="0" rtlCol="0" fromWordArt="0" anchor="ctr" anchorCtr="0" forceAA="0" compatLnSpc="1">
-            <a:prstTxWarp prst="textNoShape">
-              <a:avLst/>
-            </a:prstTxWarp>
-            <a:noAutofit/>
-          </a:bodyPr>
-          <a:lstStyle>
-            <a:lvl1pPr marL="0" indent="0">
-              <a:defRPr sz="1100">
-                <a:solidFill>
-                  <a:schemeClr val="lt1"/>
-                </a:solidFill>
-                <a:latin typeface="+mn-lt"/>
-                <a:ea typeface="+mn-ea"/>
-                <a:cs typeface="+mn-cs"/>
-              </a:defRPr>
-            </a:lvl1pPr>
-            <a:lvl2pPr marL="457200" indent="0">
-              <a:defRPr sz="1100">
-                <a:solidFill>
-                  <a:schemeClr val="lt1"/>
-                </a:solidFill>
-                <a:latin typeface="+mn-lt"/>
-                <a:ea typeface="+mn-ea"/>
-                <a:cs typeface="+mn-cs"/>
-              </a:defRPr>
-            </a:lvl2pPr>
-            <a:lvl3pPr marL="914400" indent="0">
-              <a:defRPr sz="1100">
-                <a:solidFill>
-                  <a:schemeClr val="lt1"/>
-                </a:solidFill>
-                <a:latin typeface="+mn-lt"/>
-                <a:ea typeface="+mn-ea"/>
-                <a:cs typeface="+mn-cs"/>
-              </a:defRPr>
-            </a:lvl3pPr>
-            <a:lvl4pPr marL="1371600" indent="0">
-              <a:defRPr sz="1100">
-                <a:solidFill>
-                  <a:schemeClr val="lt1"/>
-                </a:solidFill>
-                <a:latin typeface="+mn-lt"/>
-                <a:ea typeface="+mn-ea"/>
-                <a:cs typeface="+mn-cs"/>
-              </a:defRPr>
-            </a:lvl4pPr>
-            <a:lvl5pPr marL="1828800" indent="0">
-              <a:defRPr sz="1100">
-                <a:solidFill>
-                  <a:schemeClr val="lt1"/>
-                </a:solidFill>
-                <a:latin typeface="+mn-lt"/>
-                <a:ea typeface="+mn-ea"/>
-                <a:cs typeface="+mn-cs"/>
-              </a:defRPr>
-            </a:lvl5pPr>
-            <a:lvl6pPr marL="2286000" indent="0">
-              <a:defRPr sz="1100">
-                <a:solidFill>
-                  <a:schemeClr val="lt1"/>
-                </a:solidFill>
-                <a:latin typeface="+mn-lt"/>
-                <a:ea typeface="+mn-ea"/>
-                <a:cs typeface="+mn-cs"/>
-              </a:defRPr>
-            </a:lvl6pPr>
-            <a:lvl7pPr marL="2743200" indent="0">
-              <a:defRPr sz="1100">
-                <a:solidFill>
-                  <a:schemeClr val="lt1"/>
-                </a:solidFill>
-                <a:latin typeface="+mn-lt"/>
-                <a:ea typeface="+mn-ea"/>
-                <a:cs typeface="+mn-cs"/>
-              </a:defRPr>
-            </a:lvl7pPr>
-            <a:lvl8pPr marL="3200400" indent="0">
-              <a:defRPr sz="1100">
-                <a:solidFill>
-                  <a:schemeClr val="lt1"/>
-                </a:solidFill>
-                <a:latin typeface="+mn-lt"/>
-                <a:ea typeface="+mn-ea"/>
-                <a:cs typeface="+mn-cs"/>
-              </a:defRPr>
-            </a:lvl8pPr>
-            <a:lvl9pPr marL="3657600" indent="0">
-              <a:defRPr sz="1100">
-                <a:solidFill>
-                  <a:schemeClr val="lt1"/>
-                </a:solidFill>
-                <a:latin typeface="+mn-lt"/>
-                <a:ea typeface="+mn-ea"/>
-                <a:cs typeface="+mn-cs"/>
-              </a:defRPr>
-            </a:lvl9pPr>
-          </a:lstStyle>
-          <a:p>
-            <a:pPr algn="ctr"/>
-            <a:endParaRPr lang="pt-BR"/>
-          </a:p>
-        </p:txBody>
-      </p:sp>
-      <p:sp>
-        <p:nvSpPr>
-          <p:cNvPr id="9" name="Retângulo de cantos arredondados 8"/>
-          <p:cNvSpPr/>
-          <p:nvPr/>
-        </p:nvSpPr>
-        <p:spPr>
-          <a:xfrm rot="5400000">
-            <a:off x="-607282" y="2616210"/>
-            <a:ext cx="3399382" cy="1047907"/>
-          </a:xfrm>
-          <a:prstGeom prst="roundRect">
-            <a:avLst/>
-          </a:prstGeom>
-          <a:noFill/>
-          <a:ln w="19050">
-            <a:solidFill>
-              <a:srgbClr val="FF0000"/>
-            </a:solidFill>
-            <a:prstDash val="lgDash"/>
-          </a:ln>
-        </p:spPr>
-        <p:style>
-          <a:lnRef idx="2">
-            <a:schemeClr val="accent1">
-              <a:shade val="50000"/>
-            </a:schemeClr>
-          </a:lnRef>
-          <a:fillRef idx="1">
-            <a:schemeClr val="accent1"/>
-          </a:fillRef>
-          <a:effectRef idx="0">
-            <a:schemeClr val="accent1"/>
-          </a:effectRef>
-          <a:fontRef idx="minor">
-            <a:schemeClr val="lt1"/>
-          </a:fontRef>
-        </p:style>
-        <p:txBody>
-          <a:bodyPr rot="0" spcFirstLastPara="0" vert="horz" wrap="square" lIns="91440" tIns="45720" rIns="91440" bIns="45720" numCol="1" spcCol="0" rtlCol="0" fromWordArt="0" anchor="ctr" anchorCtr="0" forceAA="0" compatLnSpc="1">
-            <a:prstTxWarp prst="textNoShape">
-              <a:avLst/>
-            </a:prstTxWarp>
-            <a:noAutofit/>
-          </a:bodyPr>
-          <a:lstStyle>
-            <a:lvl1pPr marL="0" indent="0">
-              <a:defRPr sz="1100">
-                <a:solidFill>
-                  <a:schemeClr val="lt1"/>
-                </a:solidFill>
-                <a:latin typeface="+mn-lt"/>
-                <a:ea typeface="+mn-ea"/>
-                <a:cs typeface="+mn-cs"/>
-              </a:defRPr>
-            </a:lvl1pPr>
-            <a:lvl2pPr marL="457200" indent="0">
-              <a:defRPr sz="1100">
-                <a:solidFill>
-                  <a:schemeClr val="lt1"/>
-                </a:solidFill>
-                <a:latin typeface="+mn-lt"/>
-                <a:ea typeface="+mn-ea"/>
-                <a:cs typeface="+mn-cs"/>
-              </a:defRPr>
-            </a:lvl2pPr>
-            <a:lvl3pPr marL="914400" indent="0">
-              <a:defRPr sz="1100">
-                <a:solidFill>
-                  <a:schemeClr val="lt1"/>
-                </a:solidFill>
-                <a:latin typeface="+mn-lt"/>
-                <a:ea typeface="+mn-ea"/>
-                <a:cs typeface="+mn-cs"/>
-              </a:defRPr>
-            </a:lvl3pPr>
-            <a:lvl4pPr marL="1371600" indent="0">
-              <a:defRPr sz="1100">
-                <a:solidFill>
-                  <a:schemeClr val="lt1"/>
-                </a:solidFill>
-                <a:latin typeface="+mn-lt"/>
-                <a:ea typeface="+mn-ea"/>
-                <a:cs typeface="+mn-cs"/>
-              </a:defRPr>
-            </a:lvl4pPr>
-            <a:lvl5pPr marL="1828800" indent="0">
-              <a:defRPr sz="1100">
-                <a:solidFill>
-                  <a:schemeClr val="lt1"/>
-                </a:solidFill>
-                <a:latin typeface="+mn-lt"/>
-                <a:ea typeface="+mn-ea"/>
-                <a:cs typeface="+mn-cs"/>
-              </a:defRPr>
-            </a:lvl5pPr>
-            <a:lvl6pPr marL="2286000" indent="0">
-              <a:defRPr sz="1100">
-                <a:solidFill>
-                  <a:schemeClr val="lt1"/>
-                </a:solidFill>
-                <a:latin typeface="+mn-lt"/>
-                <a:ea typeface="+mn-ea"/>
-                <a:cs typeface="+mn-cs"/>
-              </a:defRPr>
-            </a:lvl6pPr>
-            <a:lvl7pPr marL="2743200" indent="0">
-              <a:defRPr sz="1100">
-                <a:solidFill>
-                  <a:schemeClr val="lt1"/>
-                </a:solidFill>
-                <a:latin typeface="+mn-lt"/>
-                <a:ea typeface="+mn-ea"/>
-                <a:cs typeface="+mn-cs"/>
-              </a:defRPr>
-            </a:lvl7pPr>
-            <a:lvl8pPr marL="3200400" indent="0">
-              <a:defRPr sz="1100">
-                <a:solidFill>
-                  <a:schemeClr val="lt1"/>
-                </a:solidFill>
-                <a:latin typeface="+mn-lt"/>
-                <a:ea typeface="+mn-ea"/>
-                <a:cs typeface="+mn-cs"/>
-              </a:defRPr>
-            </a:lvl8pPr>
-            <a:lvl9pPr marL="3657600" indent="0">
-              <a:defRPr sz="1100">
-                <a:solidFill>
-                  <a:schemeClr val="lt1"/>
-                </a:solidFill>
-                <a:latin typeface="+mn-lt"/>
-                <a:ea typeface="+mn-ea"/>
-                <a:cs typeface="+mn-cs"/>
-              </a:defRPr>
-            </a:lvl9pPr>
-          </a:lstStyle>
-          <a:p>
-            <a:pPr algn="ctr"/>
-            <a:endParaRPr lang="pt-BR"/>
-          </a:p>
-        </p:txBody>
-      </p:sp>
-      <p:pic>
-        <p:nvPicPr>
-          <p:cNvPr id="11" name="Imagem 10"/>
-          <p:cNvPicPr>
-            <a:picLocks noChangeAspect="1"/>
-          </p:cNvPicPr>
-          <p:nvPr/>
-        </p:nvPicPr>
-        <p:blipFill>
-          <a:blip r:embed="rId4"/>
-          <a:stretch>
-            <a:fillRect/>
-          </a:stretch>
-        </p:blipFill>
-        <p:spPr>
-          <a:xfrm>
-            <a:off x="4553798" y="1440472"/>
-            <a:ext cx="7048862" cy="3048401"/>
-          </a:xfrm>
-          <a:prstGeom prst="rect">
-            <a:avLst/>
-          </a:prstGeom>
-        </p:spPr>
-      </p:pic>
-      <p:sp>
-        <p:nvSpPr>
-          <p:cNvPr id="13" name="Retângulo de cantos arredondados 12"/>
-          <p:cNvSpPr/>
-          <p:nvPr/>
-        </p:nvSpPr>
-        <p:spPr>
-          <a:xfrm rot="5400000">
-            <a:off x="7330863" y="-689871"/>
-            <a:ext cx="1553720" cy="7048863"/>
-          </a:xfrm>
-          <a:prstGeom prst="roundRect">
-            <a:avLst/>
-          </a:prstGeom>
-          <a:noFill/>
-          <a:ln w="19050">
-            <a:solidFill>
-              <a:srgbClr val="FF0000"/>
-            </a:solidFill>
-            <a:prstDash val="lgDash"/>
-          </a:ln>
-        </p:spPr>
-        <p:style>
-          <a:lnRef idx="2">
-            <a:schemeClr val="accent1">
-              <a:shade val="50000"/>
-            </a:schemeClr>
-          </a:lnRef>
-          <a:fillRef idx="1">
-            <a:schemeClr val="accent1"/>
-          </a:fillRef>
-          <a:effectRef idx="0">
-            <a:schemeClr val="accent1"/>
-          </a:effectRef>
-          <a:fontRef idx="minor">
-            <a:schemeClr val="lt1"/>
-          </a:fontRef>
-        </p:style>
-        <p:txBody>
-          <a:bodyPr rot="0" spcFirstLastPara="0" vert="horz" wrap="square" lIns="91440" tIns="45720" rIns="91440" bIns="45720" numCol="1" spcCol="0" rtlCol="0" fromWordArt="0" anchor="ctr" anchorCtr="0" forceAA="0" compatLnSpc="1">
-            <a:prstTxWarp prst="textNoShape">
-              <a:avLst/>
-            </a:prstTxWarp>
-            <a:noAutofit/>
-          </a:bodyPr>
-          <a:lstStyle>
-            <a:lvl1pPr marL="0" indent="0">
-              <a:defRPr sz="1100">
-                <a:solidFill>
-                  <a:schemeClr val="lt1"/>
-                </a:solidFill>
-                <a:latin typeface="+mn-lt"/>
-                <a:ea typeface="+mn-ea"/>
-                <a:cs typeface="+mn-cs"/>
-              </a:defRPr>
-            </a:lvl1pPr>
-            <a:lvl2pPr marL="457200" indent="0">
-              <a:defRPr sz="1100">
-                <a:solidFill>
-                  <a:schemeClr val="lt1"/>
-                </a:solidFill>
-                <a:latin typeface="+mn-lt"/>
-                <a:ea typeface="+mn-ea"/>
-                <a:cs typeface="+mn-cs"/>
-              </a:defRPr>
-            </a:lvl2pPr>
-            <a:lvl3pPr marL="914400" indent="0">
-              <a:defRPr sz="1100">
-                <a:solidFill>
-                  <a:schemeClr val="lt1"/>
-                </a:solidFill>
-                <a:latin typeface="+mn-lt"/>
-                <a:ea typeface="+mn-ea"/>
-                <a:cs typeface="+mn-cs"/>
-              </a:defRPr>
-            </a:lvl3pPr>
-            <a:lvl4pPr marL="1371600" indent="0">
-              <a:defRPr sz="1100">
-                <a:solidFill>
-                  <a:schemeClr val="lt1"/>
-                </a:solidFill>
-                <a:latin typeface="+mn-lt"/>
-                <a:ea typeface="+mn-ea"/>
-                <a:cs typeface="+mn-cs"/>
-              </a:defRPr>
-            </a:lvl4pPr>
-            <a:lvl5pPr marL="1828800" indent="0">
-              <a:defRPr sz="1100">
-                <a:solidFill>
-                  <a:schemeClr val="lt1"/>
-                </a:solidFill>
-                <a:latin typeface="+mn-lt"/>
-                <a:ea typeface="+mn-ea"/>
-                <a:cs typeface="+mn-cs"/>
-              </a:defRPr>
-            </a:lvl5pPr>
-            <a:lvl6pPr marL="2286000" indent="0">
-              <a:defRPr sz="1100">
-                <a:solidFill>
-                  <a:schemeClr val="lt1"/>
-                </a:solidFill>
-                <a:latin typeface="+mn-lt"/>
-                <a:ea typeface="+mn-ea"/>
-                <a:cs typeface="+mn-cs"/>
-              </a:defRPr>
-            </a:lvl6pPr>
-            <a:lvl7pPr marL="2743200" indent="0">
-              <a:defRPr sz="1100">
-                <a:solidFill>
-                  <a:schemeClr val="lt1"/>
-                </a:solidFill>
-                <a:latin typeface="+mn-lt"/>
-                <a:ea typeface="+mn-ea"/>
-                <a:cs typeface="+mn-cs"/>
-              </a:defRPr>
-            </a:lvl7pPr>
-            <a:lvl8pPr marL="3200400" indent="0">
-              <a:defRPr sz="1100">
-                <a:solidFill>
-                  <a:schemeClr val="lt1"/>
-                </a:solidFill>
-                <a:latin typeface="+mn-lt"/>
-                <a:ea typeface="+mn-ea"/>
-                <a:cs typeface="+mn-cs"/>
-              </a:defRPr>
-            </a:lvl8pPr>
-            <a:lvl9pPr marL="3657600" indent="0">
-              <a:defRPr sz="1100">
-                <a:solidFill>
-                  <a:schemeClr val="lt1"/>
-                </a:solidFill>
-                <a:latin typeface="+mn-lt"/>
-                <a:ea typeface="+mn-ea"/>
-                <a:cs typeface="+mn-cs"/>
-              </a:defRPr>
-            </a:lvl9pPr>
-          </a:lstStyle>
-          <a:p>
-            <a:pPr algn="ctr"/>
-            <a:endParaRPr lang="pt-BR"/>
-          </a:p>
-        </p:txBody>
-      </p:sp>
-    </p:spTree>
-    <p:extLst>
-      <p:ext uri="{BB962C8B-B14F-4D97-AF65-F5344CB8AC3E}">
-        <p14:creationId xmlns:p14="http://schemas.microsoft.com/office/powerpoint/2010/main" val="1331402785"/>
-      </p:ext>
-    </p:extLst>
-  </p:cSld>
-  <p:clrMapOvr>
-    <a:masterClrMapping/>
-  </p:clrMapOvr>
-  <p:timing>
-    <p:tnLst>
-      <p:par>
-        <p:cTn id="1" dur="indefinite" restart="never" nodeType="tmRoot"/>
-      </p:par>
-    </p:tnLst>
-  </p:timing>
-</p:sld>
-</file>
-
-<file path=ppt/slides/slide11.xml><?xml version="1.0" encoding="utf-8"?>
-<p:sld xmlns:a="http://schemas.openxmlformats.org/drawingml/2006/main" xmlns:r="http://schemas.openxmlformats.org/officeDocument/2006/relationships" xmlns:p="http://schemas.openxmlformats.org/presentationml/2006/main">
-  <p:cSld>
-    <p:spTree>
-      <p:nvGrpSpPr>
-        <p:cNvPr id="1" name=""/>
-        <p:cNvGrpSpPr/>
-        <p:nvPr/>
-      </p:nvGrpSpPr>
-      <p:grpSpPr>
-        <a:xfrm>
-          <a:off x="0" y="0"/>
-          <a:ext cx="0" cy="0"/>
-          <a:chOff x="0" y="0"/>
-          <a:chExt cx="0" cy="0"/>
-        </a:xfrm>
-      </p:grpSpPr>
-      <p:sp>
-        <p:nvSpPr>
-          <p:cNvPr id="4" name="Título 3"/>
-          <p:cNvSpPr>
-            <a:spLocks noGrp="1"/>
-          </p:cNvSpPr>
-          <p:nvPr>
-            <p:ph type="ctrTitle"/>
-          </p:nvPr>
-        </p:nvSpPr>
-        <p:spPr>
-          <a:xfrm>
             <a:off x="1542472" y="1888981"/>
             <a:ext cx="9144000" cy="2387600"/>
           </a:xfrm>
@@ -5087,15 +4356,7 @@
                   <a:srgbClr val="FF0000"/>
                 </a:solidFill>
               </a:rPr>
-              <a:t> que mais falha é o </a:t>
-            </a:r>
-            <a:r>
-              <a:rPr lang="pt-BR" sz="1600" b="1" dirty="0" smtClean="0">
-                <a:solidFill>
-                  <a:srgbClr val="FF0000"/>
-                </a:solidFill>
-              </a:rPr>
-              <a:t>C</a:t>
+              <a:t> que mais falha é o C</a:t>
             </a:r>
             <a:r>
               <a:rPr lang="pt-BR" sz="1600" dirty="0" smtClean="0"/>
@@ -5139,17 +4400,8 @@
             </a:r>
             <a:r>
               <a:rPr lang="pt-BR" sz="1600" dirty="0" smtClean="0"/>
-              <a:t> </a:t>
-            </a:r>
-            <a:r>
-              <a:rPr lang="pt-BR" sz="1600" dirty="0" smtClean="0"/>
-              <a:t>C. Se tais falhas estão concentradas num período espec</a:t>
-            </a:r>
-            <a:r>
-              <a:rPr lang="pt-BR" sz="1600" dirty="0" smtClean="0"/>
-              <a:t>ífico que indica fraude, ou por falta de funcionamento adequado.</a:t>
-            </a:r>
-            <a:endParaRPr lang="pt-BR" sz="1600" dirty="0" smtClean="0"/>
+              <a:t> C. Se tais falhas estão concentradas num período específico que indica fraude, ou por falta de funcionamento adequado.</a:t>
+            </a:r>
           </a:p>
           <a:p>
             <a:pPr marL="285750" indent="-285750">
@@ -5482,7 +4734,7 @@
         </p:blipFill>
         <p:spPr>
           <a:xfrm>
-            <a:off x="489200" y="1765004"/>
+            <a:off x="590800" y="1617222"/>
             <a:ext cx="6160981" cy="4401350"/>
           </a:xfrm>
           <a:prstGeom prst="rect">
@@ -5490,149 +4742,6 @@
           </a:prstGeom>
         </p:spPr>
       </p:pic>
-      <p:sp>
-        <p:nvSpPr>
-          <p:cNvPr id="6" name="Retângulo de cantos arredondados 5"/>
-          <p:cNvSpPr/>
-          <p:nvPr/>
-        </p:nvSpPr>
-        <p:spPr>
-          <a:xfrm rot="5400000">
-            <a:off x="-604554" y="3561469"/>
-            <a:ext cx="4571143" cy="978213"/>
-          </a:xfrm>
-          <a:prstGeom prst="roundRect">
-            <a:avLst/>
-          </a:prstGeom>
-          <a:noFill/>
-          <a:ln w="19050">
-            <a:solidFill>
-              <a:srgbClr val="FF0000"/>
-            </a:solidFill>
-            <a:prstDash val="lgDash"/>
-          </a:ln>
-        </p:spPr>
-        <p:style>
-          <a:lnRef idx="2">
-            <a:schemeClr val="accent1">
-              <a:shade val="50000"/>
-            </a:schemeClr>
-          </a:lnRef>
-          <a:fillRef idx="1">
-            <a:schemeClr val="accent1"/>
-          </a:fillRef>
-          <a:effectRef idx="0">
-            <a:schemeClr val="accent1"/>
-          </a:effectRef>
-          <a:fontRef idx="minor">
-            <a:schemeClr val="lt1"/>
-          </a:fontRef>
-        </p:style>
-        <p:txBody>
-          <a:bodyPr rot="0" spcFirstLastPara="0" vert="horz" wrap="square" lIns="91440" tIns="45720" rIns="91440" bIns="45720" numCol="1" spcCol="0" rtlCol="0" fromWordArt="0" anchor="ctr" anchorCtr="0" forceAA="0" compatLnSpc="1">
-            <a:prstTxWarp prst="textNoShape">
-              <a:avLst/>
-            </a:prstTxWarp>
-            <a:noAutofit/>
-          </a:bodyPr>
-          <a:lstStyle>
-            <a:lvl1pPr marL="0" indent="0">
-              <a:defRPr sz="1100">
-                <a:solidFill>
-                  <a:schemeClr val="lt1"/>
-                </a:solidFill>
-                <a:latin typeface="+mn-lt"/>
-                <a:ea typeface="+mn-ea"/>
-                <a:cs typeface="+mn-cs"/>
-              </a:defRPr>
-            </a:lvl1pPr>
-            <a:lvl2pPr marL="457200" indent="0">
-              <a:defRPr sz="1100">
-                <a:solidFill>
-                  <a:schemeClr val="lt1"/>
-                </a:solidFill>
-                <a:latin typeface="+mn-lt"/>
-                <a:ea typeface="+mn-ea"/>
-                <a:cs typeface="+mn-cs"/>
-              </a:defRPr>
-            </a:lvl2pPr>
-            <a:lvl3pPr marL="914400" indent="0">
-              <a:defRPr sz="1100">
-                <a:solidFill>
-                  <a:schemeClr val="lt1"/>
-                </a:solidFill>
-                <a:latin typeface="+mn-lt"/>
-                <a:ea typeface="+mn-ea"/>
-                <a:cs typeface="+mn-cs"/>
-              </a:defRPr>
-            </a:lvl3pPr>
-            <a:lvl4pPr marL="1371600" indent="0">
-              <a:defRPr sz="1100">
-                <a:solidFill>
-                  <a:schemeClr val="lt1"/>
-                </a:solidFill>
-                <a:latin typeface="+mn-lt"/>
-                <a:ea typeface="+mn-ea"/>
-                <a:cs typeface="+mn-cs"/>
-              </a:defRPr>
-            </a:lvl4pPr>
-            <a:lvl5pPr marL="1828800" indent="0">
-              <a:defRPr sz="1100">
-                <a:solidFill>
-                  <a:schemeClr val="lt1"/>
-                </a:solidFill>
-                <a:latin typeface="+mn-lt"/>
-                <a:ea typeface="+mn-ea"/>
-                <a:cs typeface="+mn-cs"/>
-              </a:defRPr>
-            </a:lvl5pPr>
-            <a:lvl6pPr marL="2286000" indent="0">
-              <a:defRPr sz="1100">
-                <a:solidFill>
-                  <a:schemeClr val="lt1"/>
-                </a:solidFill>
-                <a:latin typeface="+mn-lt"/>
-                <a:ea typeface="+mn-ea"/>
-                <a:cs typeface="+mn-cs"/>
-              </a:defRPr>
-            </a:lvl6pPr>
-            <a:lvl7pPr marL="2743200" indent="0">
-              <a:defRPr sz="1100">
-                <a:solidFill>
-                  <a:schemeClr val="lt1"/>
-                </a:solidFill>
-                <a:latin typeface="+mn-lt"/>
-                <a:ea typeface="+mn-ea"/>
-                <a:cs typeface="+mn-cs"/>
-              </a:defRPr>
-            </a:lvl7pPr>
-            <a:lvl8pPr marL="3200400" indent="0">
-              <a:defRPr sz="1100">
-                <a:solidFill>
-                  <a:schemeClr val="lt1"/>
-                </a:solidFill>
-                <a:latin typeface="+mn-lt"/>
-                <a:ea typeface="+mn-ea"/>
-                <a:cs typeface="+mn-cs"/>
-              </a:defRPr>
-            </a:lvl8pPr>
-            <a:lvl9pPr marL="3657600" indent="0">
-              <a:defRPr sz="1100">
-                <a:solidFill>
-                  <a:schemeClr val="lt1"/>
-                </a:solidFill>
-                <a:latin typeface="+mn-lt"/>
-                <a:ea typeface="+mn-ea"/>
-                <a:cs typeface="+mn-cs"/>
-              </a:defRPr>
-            </a:lvl9pPr>
-          </a:lstStyle>
-          <a:p>
-            <a:pPr algn="ctr"/>
-            <a:endParaRPr lang="pt-BR"/>
-          </a:p>
-        </p:txBody>
-      </p:sp>
     </p:spTree>
     <p:extLst>
       <p:ext uri="{BB962C8B-B14F-4D97-AF65-F5344CB8AC3E}">
@@ -5770,7 +4879,7 @@
         <p:spPr>
           <a:xfrm>
             <a:off x="7410893" y="1765004"/>
-            <a:ext cx="4263656" cy="4185761"/>
+            <a:ext cx="4263656" cy="5416868"/>
           </a:xfrm>
           <a:prstGeom prst="rect">
             <a:avLst/>
@@ -5843,6 +4952,20 @@
             <a:r>
               <a:rPr lang="pt-BR" sz="1600" dirty="0" smtClean="0"/>
               <a:t>Impactos: maior corte na similaridade tenderia à diminuição de fraude. No entanto, esse aumento do corte pode causar um estresse na base de motoristas, causando descontentamento e abandono da plataforma. </a:t>
+            </a:r>
+          </a:p>
+          <a:p>
+            <a:pPr algn="just"/>
+            <a:endParaRPr lang="pt-BR" sz="1600" dirty="0"/>
+          </a:p>
+          <a:p>
+            <a:pPr marL="285750" indent="-285750" algn="just">
+              <a:buFont typeface="Arial" panose="020B0604020202020204" pitchFamily="34" charset="0"/>
+              <a:buChar char="•"/>
+            </a:pPr>
+            <a:r>
+              <a:rPr lang="pt-BR" sz="1600" dirty="0"/>
+              <a:t>Ações: Testar esse novo corte da similaridade em uma parte da base para estudar o comportamento das sessões negadas dos motoristas e direcionar futuras ações.</a:t>
             </a:r>
           </a:p>
           <a:p>
@@ -5963,7 +5086,7 @@
         <p:spPr>
           <a:xfrm>
             <a:off x="0" y="0"/>
-            <a:ext cx="8293395" cy="913003"/>
+            <a:ext cx="9090838" cy="848349"/>
           </a:xfrm>
         </p:spPr>
         <p:txBody>
@@ -5974,29 +5097,14 @@
           <a:p>
             <a:pPr algn="l"/>
             <a:r>
-              <a:rPr lang="pt-BR" sz="2700" b="1" dirty="0" smtClean="0">
+              <a:rPr lang="pt-BR" sz="2800" b="1" dirty="0" smtClean="0">
                 <a:solidFill>
                   <a:srgbClr val="FF0000"/>
                 </a:solidFill>
               </a:rPr>
-              <a:t/>
-            </a:r>
-            <a:br>
-              <a:rPr lang="pt-BR" sz="2700" b="1" dirty="0" smtClean="0">
-                <a:solidFill>
-                  <a:srgbClr val="FF0000"/>
-                </a:solidFill>
-              </a:rPr>
-            </a:br>
-            <a:r>
-              <a:rPr lang="pt-BR" sz="2800" b="1" dirty="0" smtClean="0">
-                <a:solidFill>
-                  <a:srgbClr val="FF0000"/>
-                </a:solidFill>
-              </a:rPr>
-              <a:t>Similaridade Real x Projetada</a:t>
-            </a:r>
-            <a:endParaRPr lang="pt-BR" sz="2800" dirty="0"/>
+              <a:t>Relação do Volume de Pedidos Cancelados por Status</a:t>
+            </a:r>
+            <a:endParaRPr lang="pt-BR" sz="2400" dirty="0"/>
           </a:p>
         </p:txBody>
       </p:sp>
@@ -6049,8 +5157,8 @@
         </p:nvSpPr>
         <p:spPr>
           <a:xfrm>
-            <a:off x="7223111" y="1678706"/>
-            <a:ext cx="4263656" cy="3693319"/>
+            <a:off x="345556" y="4710472"/>
+            <a:ext cx="11392788" cy="2677656"/>
           </a:xfrm>
           <a:prstGeom prst="rect">
             <a:avLst/>
@@ -6069,33 +5177,8 @@
             </a:pPr>
             <a:r>
               <a:rPr lang="pt-BR" sz="1600" dirty="0" smtClean="0"/>
-              <a:t>Considerando o valor de pedidos dos entregadores com status = MATCH o valor cai cerca de </a:t>
-            </a:r>
-            <a:r>
-              <a:rPr lang="pt-BR" sz="1600" b="1" dirty="0" smtClean="0">
-                <a:solidFill>
-                  <a:srgbClr val="FF0000"/>
-                </a:solidFill>
-              </a:rPr>
-              <a:t>R$ 143.000</a:t>
-            </a:r>
-            <a:r>
-              <a:rPr lang="pt-BR" sz="1600" dirty="0" smtClean="0"/>
-              <a:t>, uma diferença de </a:t>
-            </a:r>
-            <a:r>
-              <a:rPr lang="pt-BR" sz="1600" b="1" dirty="0" smtClean="0">
-                <a:solidFill>
-                  <a:srgbClr val="FF0000"/>
-                </a:solidFill>
-              </a:rPr>
-              <a:t>33%</a:t>
-            </a:r>
-            <a:r>
-              <a:rPr lang="pt-BR" sz="1600" dirty="0" smtClean="0"/>
-              <a:t>.	</a:t>
-            </a:r>
-            <a:endParaRPr lang="pt-BR" sz="1600" dirty="0"/>
+              <a:t>Existe uma relação entre o volume de pedidos cancelados por entregador e o status do processo de identificação. Nesse caso, entregadores com status ‘NOT_MATCH’ tem um índice maior do que os demais. Estatisticamente falando, a correlação das variáveis indica que quanto maior a quantidade de entregadores ou pedidos, menor a quantidade de pedidos cancelados por entregador. </a:t>
+            </a:r>
           </a:p>
           <a:p>
             <a:pPr marL="285750" indent="-285750" algn="just">
@@ -6111,8 +5194,15 @@
             </a:pPr>
             <a:r>
               <a:rPr lang="pt-BR" sz="1600" dirty="0" smtClean="0"/>
-              <a:t>Ações: Testar esse novo corte da similaridade em uma parte da base para estudar o comportamento das sessões negadas dos motoristas e direcionar futuras ações.</a:t>
-            </a:r>
+              <a:t>Ações: acompanhar o indicador de pedidos cancelados por entregador e status com o intuito de monitorar comportamentos fora do padrão ao longo do tempo.</a:t>
+            </a:r>
+          </a:p>
+          <a:p>
+            <a:pPr marL="285750" indent="-285750">
+              <a:buFont typeface="Arial" panose="020B0604020202020204" pitchFamily="34" charset="0"/>
+              <a:buChar char="•"/>
+            </a:pPr>
+            <a:endParaRPr lang="pt-BR" dirty="0"/>
           </a:p>
           <a:p>
             <a:pPr marL="285750" indent="-285750">
@@ -6122,53 +5212,62 @@
             <a:endParaRPr lang="pt-BR" dirty="0" smtClean="0"/>
           </a:p>
           <a:p>
+            <a:pPr marL="742950" lvl="1" indent="-285750">
+              <a:buFont typeface="Arial" panose="020B0604020202020204" pitchFamily="34" charset="0"/>
+              <a:buChar char="•"/>
+            </a:pPr>
+            <a:endParaRPr lang="pt-BR" dirty="0"/>
+          </a:p>
+          <a:p>
             <a:pPr marL="285750" indent="-285750">
               <a:buFont typeface="Arial" panose="020B0604020202020204" pitchFamily="34" charset="0"/>
               <a:buChar char="•"/>
             </a:pPr>
             <a:endParaRPr lang="pt-BR" dirty="0"/>
           </a:p>
-          <a:p>
-            <a:pPr marL="285750" indent="-285750">
-              <a:buFont typeface="Arial" panose="020B0604020202020204" pitchFamily="34" charset="0"/>
-              <a:buChar char="•"/>
-            </a:pPr>
-            <a:endParaRPr lang="pt-BR" dirty="0" smtClean="0"/>
-          </a:p>
-          <a:p>
-            <a:pPr marL="742950" lvl="1" indent="-285750">
-              <a:buFont typeface="Arial" panose="020B0604020202020204" pitchFamily="34" charset="0"/>
-              <a:buChar char="•"/>
-            </a:pPr>
-            <a:endParaRPr lang="pt-BR" dirty="0"/>
-          </a:p>
-          <a:p>
-            <a:pPr marL="285750" indent="-285750">
-              <a:buFont typeface="Arial" panose="020B0604020202020204" pitchFamily="34" charset="0"/>
-              <a:buChar char="•"/>
-            </a:pPr>
-            <a:endParaRPr lang="pt-BR" dirty="0"/>
-          </a:p>
         </p:txBody>
       </p:sp>
       <p:pic>
         <p:nvPicPr>
-          <p:cNvPr id="2" name="Imagem 1"/>
+          <p:cNvPr id="7" name="Imagem 6"/>
+          <p:cNvPicPr>
+            <a:picLocks noChangeAspect="1"/>
+          </p:cNvPicPr>
+          <p:nvPr/>
+        </p:nvPicPr>
+        <p:blipFill rotWithShape="1">
+          <a:blip r:embed="rId3"/>
+          <a:srcRect l="1053"/>
+          <a:stretch/>
+        </p:blipFill>
+        <p:spPr>
+          <a:xfrm>
+            <a:off x="565092" y="1512084"/>
+            <a:ext cx="4581066" cy="3027770"/>
+          </a:xfrm>
+          <a:prstGeom prst="rect">
+            <a:avLst/>
+          </a:prstGeom>
+        </p:spPr>
+      </p:pic>
+      <p:pic>
+        <p:nvPicPr>
+          <p:cNvPr id="8" name="Imagem 7"/>
           <p:cNvPicPr>
             <a:picLocks noChangeAspect="1"/>
           </p:cNvPicPr>
           <p:nvPr/>
         </p:nvPicPr>
         <p:blipFill>
-          <a:blip r:embed="rId3"/>
+          <a:blip r:embed="rId4"/>
           <a:stretch>
             <a:fillRect/>
           </a:stretch>
         </p:blipFill>
         <p:spPr>
           <a:xfrm>
-            <a:off x="403966" y="1425787"/>
-            <a:ext cx="6819145" cy="4199158"/>
+            <a:off x="5277498" y="1394878"/>
+            <a:ext cx="5386958" cy="3262183"/>
           </a:xfrm>
           <a:prstGeom prst="rect">
             <a:avLst/>
@@ -6178,7 +5277,7 @@
     </p:spTree>
     <p:extLst>
       <p:ext uri="{BB962C8B-B14F-4D97-AF65-F5344CB8AC3E}">
-        <p14:creationId xmlns:p14="http://schemas.microsoft.com/office/powerpoint/2010/main" val="2753794097"/>
+        <p14:creationId xmlns:p14="http://schemas.microsoft.com/office/powerpoint/2010/main" val="1741891762"/>
       </p:ext>
     </p:extLst>
   </p:cSld>
@@ -6224,8 +5323,8 @@
         </p:nvSpPr>
         <p:spPr>
           <a:xfrm>
-            <a:off x="0" y="0"/>
-            <a:ext cx="9090838" cy="848349"/>
+            <a:off x="8379" y="10633"/>
+            <a:ext cx="9090838" cy="1263985"/>
           </a:xfrm>
         </p:spPr>
         <p:txBody>
@@ -6241,9 +5340,40 @@
                   <a:srgbClr val="FF0000"/>
                 </a:solidFill>
               </a:rPr>
-              <a:t>Relação do Volume de Pedidos Cancelados por Status</a:t>
-            </a:r>
-            <a:endParaRPr lang="pt-BR" sz="2400" dirty="0"/>
+              <a:t>Comportamento de Acessos </a:t>
+            </a:r>
+            <a:r>
+              <a:rPr lang="pt-BR" sz="2800" b="1" dirty="0">
+                <a:solidFill>
+                  <a:srgbClr val="FF0000"/>
+                </a:solidFill>
+              </a:rPr>
+              <a:t>N</a:t>
+            </a:r>
+            <a:r>
+              <a:rPr lang="pt-BR" sz="2800" b="1" dirty="0" smtClean="0">
+                <a:solidFill>
+                  <a:srgbClr val="FF0000"/>
+                </a:solidFill>
+              </a:rPr>
+              <a:t>egados no Período</a:t>
+            </a:r>
+            <a:r>
+              <a:rPr lang="pt-BR" sz="2600" b="1" dirty="0" smtClean="0">
+                <a:solidFill>
+                  <a:srgbClr val="FF0000"/>
+                </a:solidFill>
+              </a:rPr>
+              <a:t/>
+            </a:r>
+            <a:br>
+              <a:rPr lang="pt-BR" sz="2600" b="1" dirty="0" smtClean="0">
+                <a:solidFill>
+                  <a:srgbClr val="FF0000"/>
+                </a:solidFill>
+              </a:rPr>
+            </a:br>
+            <a:endParaRPr lang="pt-BR" sz="2600" dirty="0"/>
           </a:p>
         </p:txBody>
       </p:sp>
@@ -6296,8 +5426,8 @@
         </p:nvSpPr>
         <p:spPr>
           <a:xfrm>
-            <a:off x="345556" y="4710472"/>
-            <a:ext cx="11392788" cy="2677656"/>
+            <a:off x="372255" y="4912242"/>
+            <a:ext cx="11650176" cy="2154436"/>
           </a:xfrm>
           <a:prstGeom prst="rect">
             <a:avLst/>
@@ -6316,7 +5446,7 @@
             </a:pPr>
             <a:r>
               <a:rPr lang="pt-BR" sz="1600" dirty="0" smtClean="0"/>
-              <a:t>Existe uma relação entre o volume de pedidos cancelados por entregador e o status do processo de identificação. Nesse caso, entregadores com status ‘NOT_MATCH’ tem um índice maior do que os demais. Estatisticamente falando, a correlação das variáveis indica que quanto maior a quantidade de entregadores ou pedidos, menor a quantidade de pedidos cancelados por entregador. </a:t>
+              <a:t>Houve um pico de acessos negados entre o dia 15 e 17 e o da 30 ficaram fora da média de acesos negados do período (31 dias).  Esses dias merecem ser investigados no detalhe com o intuito de entender se houve alguma instabilidade na  plataforma, data comemorativa ou algo que possa ter influenciado tal comportamento.</a:t>
             </a:r>
           </a:p>
           <a:p>
@@ -6333,8 +5463,23 @@
             </a:pPr>
             <a:r>
               <a:rPr lang="pt-BR" sz="1600" dirty="0" smtClean="0"/>
-              <a:t>Ações: acompanhar o indicador de pedidos cancelados por entregador e status com o intuito de monitorar comportamentos fora do padrão ao longo do tempo.</a:t>
-            </a:r>
+              <a:t>Ações: Ajustar cálculo da média para média móvel e colocar em produção o indicador para monitorar comportamentos atípicos.</a:t>
+            </a:r>
+            <a:endParaRPr lang="pt-BR" sz="1600" dirty="0"/>
+          </a:p>
+          <a:p>
+            <a:pPr marL="285750" indent="-285750">
+              <a:buFont typeface="Arial" panose="020B0604020202020204" pitchFamily="34" charset="0"/>
+              <a:buChar char="•"/>
+            </a:pPr>
+            <a:endParaRPr lang="pt-BR" dirty="0" smtClean="0"/>
+          </a:p>
+          <a:p>
+            <a:pPr marL="742950" lvl="1" indent="-285750">
+              <a:buFont typeface="Arial" panose="020B0604020202020204" pitchFamily="34" charset="0"/>
+              <a:buChar char="•"/>
+            </a:pPr>
+            <a:endParaRPr lang="pt-BR" dirty="0"/>
           </a:p>
           <a:p>
             <a:pPr marL="285750" indent="-285750">
@@ -6343,70 +5488,26 @@
             </a:pPr>
             <a:endParaRPr lang="pt-BR" dirty="0"/>
           </a:p>
-          <a:p>
-            <a:pPr marL="285750" indent="-285750">
-              <a:buFont typeface="Arial" panose="020B0604020202020204" pitchFamily="34" charset="0"/>
-              <a:buChar char="•"/>
-            </a:pPr>
-            <a:endParaRPr lang="pt-BR" dirty="0" smtClean="0"/>
-          </a:p>
-          <a:p>
-            <a:pPr marL="742950" lvl="1" indent="-285750">
-              <a:buFont typeface="Arial" panose="020B0604020202020204" pitchFamily="34" charset="0"/>
-              <a:buChar char="•"/>
-            </a:pPr>
-            <a:endParaRPr lang="pt-BR" dirty="0"/>
-          </a:p>
-          <a:p>
-            <a:pPr marL="285750" indent="-285750">
-              <a:buFont typeface="Arial" panose="020B0604020202020204" pitchFamily="34" charset="0"/>
-              <a:buChar char="•"/>
-            </a:pPr>
-            <a:endParaRPr lang="pt-BR" dirty="0"/>
-          </a:p>
         </p:txBody>
       </p:sp>
       <p:pic>
         <p:nvPicPr>
-          <p:cNvPr id="7" name="Imagem 6"/>
-          <p:cNvPicPr>
-            <a:picLocks noChangeAspect="1"/>
-          </p:cNvPicPr>
-          <p:nvPr/>
-        </p:nvPicPr>
-        <p:blipFill rotWithShape="1">
-          <a:blip r:embed="rId3"/>
-          <a:srcRect l="1053"/>
-          <a:stretch/>
-        </p:blipFill>
-        <p:spPr>
-          <a:xfrm>
-            <a:off x="565092" y="1512084"/>
-            <a:ext cx="4581066" cy="3027770"/>
-          </a:xfrm>
-          <a:prstGeom prst="rect">
-            <a:avLst/>
-          </a:prstGeom>
-        </p:spPr>
-      </p:pic>
-      <p:pic>
-        <p:nvPicPr>
-          <p:cNvPr id="8" name="Imagem 7"/>
+          <p:cNvPr id="2" name="Imagem 1"/>
           <p:cNvPicPr>
             <a:picLocks noChangeAspect="1"/>
           </p:cNvPicPr>
           <p:nvPr/>
         </p:nvPicPr>
         <p:blipFill>
-          <a:blip r:embed="rId4"/>
+          <a:blip r:embed="rId3"/>
           <a:stretch>
             <a:fillRect/>
           </a:stretch>
         </p:blipFill>
         <p:spPr>
           <a:xfrm>
-            <a:off x="5277498" y="1394878"/>
-            <a:ext cx="5386958" cy="3262183"/>
+            <a:off x="183861" y="1458673"/>
+            <a:ext cx="9349855" cy="3453569"/>
           </a:xfrm>
           <a:prstGeom prst="rect">
             <a:avLst/>
@@ -6416,7 +5517,7 @@
     </p:spTree>
     <p:extLst>
       <p:ext uri="{BB962C8B-B14F-4D97-AF65-F5344CB8AC3E}">
-        <p14:creationId xmlns:p14="http://schemas.microsoft.com/office/powerpoint/2010/main" val="1741891762"/>
+        <p14:creationId xmlns:p14="http://schemas.microsoft.com/office/powerpoint/2010/main" val="1133217372"/>
       </p:ext>
     </p:extLst>
   </p:cSld>
@@ -6479,23 +5580,7 @@
                   <a:srgbClr val="FF0000"/>
                 </a:solidFill>
               </a:rPr>
-              <a:t>Comportamento de Acessos </a:t>
-            </a:r>
-            <a:r>
-              <a:rPr lang="pt-BR" sz="2800" b="1" dirty="0">
-                <a:solidFill>
-                  <a:srgbClr val="FF0000"/>
-                </a:solidFill>
-              </a:rPr>
-              <a:t>N</a:t>
-            </a:r>
-            <a:r>
-              <a:rPr lang="pt-BR" sz="2800" b="1" dirty="0" smtClean="0">
-                <a:solidFill>
-                  <a:srgbClr val="FF0000"/>
-                </a:solidFill>
-              </a:rPr>
-              <a:t>egados no Período</a:t>
+              <a:t>Análise dos Dias com Picos de Acessos Negados</a:t>
             </a:r>
             <a:r>
               <a:rPr lang="pt-BR" sz="2600" b="1" dirty="0" smtClean="0">
@@ -6566,7 +5651,7 @@
         <p:spPr>
           <a:xfrm>
             <a:off x="372255" y="4912242"/>
-            <a:ext cx="11650176" cy="2154436"/>
+            <a:ext cx="11650176" cy="2123658"/>
           </a:xfrm>
           <a:prstGeom prst="rect">
             <a:avLst/>
@@ -6585,7 +5670,59 @@
             </a:pPr>
             <a:r>
               <a:rPr lang="pt-BR" sz="1600" dirty="0" smtClean="0"/>
-              <a:t>Houve um pico de acessos negados entre o dia 15 e 17 e o da 30 ficaram fora da média de acesos negados do período (31 dias).  Esses dias merecem ser investigados no detalhe com o intuito de entender se houve alguma instabilidade na  plataforma, data comemorativa ou algo que possa ter influenciado tal comportamento.</a:t>
+              <a:t>Dos 24 acessos negados nos dias acima da média, 9 são referentes a entregadores da categoria </a:t>
+            </a:r>
+            <a:r>
+              <a:rPr lang="pt-BR" sz="1600" b="1" dirty="0" smtClean="0">
+                <a:solidFill>
+                  <a:srgbClr val="FF0000"/>
+                </a:solidFill>
+              </a:rPr>
+              <a:t>Prata</a:t>
+            </a:r>
+            <a:r>
+              <a:rPr lang="pt-BR" sz="1600" dirty="0" smtClean="0"/>
+              <a:t>, cerca de </a:t>
+            </a:r>
+            <a:r>
+              <a:rPr lang="pt-BR" sz="1600" b="1" dirty="0" smtClean="0">
+                <a:solidFill>
+                  <a:srgbClr val="FF0000"/>
+                </a:solidFill>
+              </a:rPr>
+              <a:t>38%</a:t>
+            </a:r>
+            <a:r>
+              <a:rPr lang="pt-BR" sz="1600" dirty="0" smtClean="0"/>
+              <a:t>. Contudo, mesmo que esses entregadores sejam da categoria Prata, eles não são os mais antigos na plataforma. Os entregadores mais antigos com acessos negados nos dias de análise são das categorias </a:t>
+            </a:r>
+            <a:r>
+              <a:rPr lang="pt-BR" sz="1600" b="1" dirty="0" smtClean="0">
+                <a:solidFill>
+                  <a:srgbClr val="FF0000"/>
+                </a:solidFill>
+              </a:rPr>
+              <a:t>Iniciante </a:t>
+            </a:r>
+            <a:r>
+              <a:rPr lang="pt-BR" sz="1600" dirty="0" smtClean="0"/>
+              <a:t>e</a:t>
+            </a:r>
+            <a:r>
+              <a:rPr lang="pt-BR" sz="1600" b="1" dirty="0" smtClean="0">
+                <a:solidFill>
+                  <a:srgbClr val="FF0000"/>
+                </a:solidFill>
+              </a:rPr>
+              <a:t> Bronze</a:t>
+            </a:r>
+            <a:r>
+              <a:rPr lang="pt-BR" sz="1600" dirty="0"/>
+              <a:t>,</a:t>
+            </a:r>
+            <a:r>
+              <a:rPr lang="pt-BR" sz="1600" dirty="0" smtClean="0"/>
+              <a:t> o que indica que essas contas são usadas com o intuito de fraude.</a:t>
             </a:r>
           </a:p>
           <a:p>
@@ -6602,15 +5739,16 @@
             </a:pPr>
             <a:r>
               <a:rPr lang="pt-BR" sz="1600" dirty="0" smtClean="0"/>
-              <a:t>Ações: Ajustar cálculo da média para média móvel e colocar em produção o indicador para monitorar comportamentos atípicos.</a:t>
-            </a:r>
-            <a:endParaRPr lang="pt-BR" sz="1600" dirty="0"/>
-          </a:p>
-          <a:p>
-            <a:pPr marL="285750" indent="-285750">
-              <a:buFont typeface="Arial" panose="020B0604020202020204" pitchFamily="34" charset="0"/>
-              <a:buChar char="•"/>
-            </a:pPr>
+              <a:t>Ação: Encaminhar esses usuários para uma análise detalhada no fluxo </a:t>
+            </a:r>
+            <a:r>
+              <a:rPr lang="pt-BR" sz="1600" dirty="0" err="1" smtClean="0"/>
+              <a:t>stack</a:t>
+            </a:r>
+            <a:r>
+              <a:rPr lang="pt-BR" sz="1600" dirty="0" smtClean="0"/>
+              <a:t>.</a:t>
+            </a:r>
             <a:endParaRPr lang="pt-BR" dirty="0" smtClean="0"/>
           </a:p>
           <a:p>
@@ -6631,7 +5769,7 @@
       </p:sp>
       <p:pic>
         <p:nvPicPr>
-          <p:cNvPr id="2" name="Imagem 1"/>
+          <p:cNvPr id="5" name="Imagem 4"/>
           <p:cNvPicPr>
             <a:picLocks noChangeAspect="1"/>
           </p:cNvPicPr>
@@ -6645,18 +5783,471 @@
         </p:blipFill>
         <p:spPr>
           <a:xfrm>
-            <a:off x="183861" y="1458673"/>
-            <a:ext cx="9349855" cy="3453569"/>
+            <a:off x="249125" y="1274618"/>
+            <a:ext cx="4756676" cy="3291450"/>
           </a:xfrm>
           <a:prstGeom prst="rect">
             <a:avLst/>
           </a:prstGeom>
         </p:spPr>
       </p:pic>
+      <p:sp>
+        <p:nvSpPr>
+          <p:cNvPr id="8" name="Retângulo de cantos arredondados 7"/>
+          <p:cNvSpPr/>
+          <p:nvPr/>
+        </p:nvSpPr>
+        <p:spPr>
+          <a:xfrm rot="5400000">
+            <a:off x="2914084" y="1814955"/>
+            <a:ext cx="397562" cy="775434"/>
+          </a:xfrm>
+          <a:prstGeom prst="roundRect">
+            <a:avLst/>
+          </a:prstGeom>
+          <a:noFill/>
+          <a:ln w="19050">
+            <a:solidFill>
+              <a:srgbClr val="FF0000"/>
+            </a:solidFill>
+            <a:prstDash val="lgDash"/>
+          </a:ln>
+        </p:spPr>
+        <p:style>
+          <a:lnRef idx="2">
+            <a:schemeClr val="accent1">
+              <a:shade val="50000"/>
+            </a:schemeClr>
+          </a:lnRef>
+          <a:fillRef idx="1">
+            <a:schemeClr val="accent1"/>
+          </a:fillRef>
+          <a:effectRef idx="0">
+            <a:schemeClr val="accent1"/>
+          </a:effectRef>
+          <a:fontRef idx="minor">
+            <a:schemeClr val="lt1"/>
+          </a:fontRef>
+        </p:style>
+        <p:txBody>
+          <a:bodyPr rot="0" spcFirstLastPara="0" vert="horz" wrap="square" lIns="91440" tIns="45720" rIns="91440" bIns="45720" numCol="1" spcCol="0" rtlCol="0" fromWordArt="0" anchor="ctr" anchorCtr="0" forceAA="0" compatLnSpc="1">
+            <a:prstTxWarp prst="textNoShape">
+              <a:avLst/>
+            </a:prstTxWarp>
+            <a:noAutofit/>
+          </a:bodyPr>
+          <a:lstStyle>
+            <a:lvl1pPr marL="0" indent="0">
+              <a:defRPr sz="1100">
+                <a:solidFill>
+                  <a:schemeClr val="lt1"/>
+                </a:solidFill>
+                <a:latin typeface="+mn-lt"/>
+                <a:ea typeface="+mn-ea"/>
+                <a:cs typeface="+mn-cs"/>
+              </a:defRPr>
+            </a:lvl1pPr>
+            <a:lvl2pPr marL="457200" indent="0">
+              <a:defRPr sz="1100">
+                <a:solidFill>
+                  <a:schemeClr val="lt1"/>
+                </a:solidFill>
+                <a:latin typeface="+mn-lt"/>
+                <a:ea typeface="+mn-ea"/>
+                <a:cs typeface="+mn-cs"/>
+              </a:defRPr>
+            </a:lvl2pPr>
+            <a:lvl3pPr marL="914400" indent="0">
+              <a:defRPr sz="1100">
+                <a:solidFill>
+                  <a:schemeClr val="lt1"/>
+                </a:solidFill>
+                <a:latin typeface="+mn-lt"/>
+                <a:ea typeface="+mn-ea"/>
+                <a:cs typeface="+mn-cs"/>
+              </a:defRPr>
+            </a:lvl3pPr>
+            <a:lvl4pPr marL="1371600" indent="0">
+              <a:defRPr sz="1100">
+                <a:solidFill>
+                  <a:schemeClr val="lt1"/>
+                </a:solidFill>
+                <a:latin typeface="+mn-lt"/>
+                <a:ea typeface="+mn-ea"/>
+                <a:cs typeface="+mn-cs"/>
+              </a:defRPr>
+            </a:lvl4pPr>
+            <a:lvl5pPr marL="1828800" indent="0">
+              <a:defRPr sz="1100">
+                <a:solidFill>
+                  <a:schemeClr val="lt1"/>
+                </a:solidFill>
+                <a:latin typeface="+mn-lt"/>
+                <a:ea typeface="+mn-ea"/>
+                <a:cs typeface="+mn-cs"/>
+              </a:defRPr>
+            </a:lvl5pPr>
+            <a:lvl6pPr marL="2286000" indent="0">
+              <a:defRPr sz="1100">
+                <a:solidFill>
+                  <a:schemeClr val="lt1"/>
+                </a:solidFill>
+                <a:latin typeface="+mn-lt"/>
+                <a:ea typeface="+mn-ea"/>
+                <a:cs typeface="+mn-cs"/>
+              </a:defRPr>
+            </a:lvl6pPr>
+            <a:lvl7pPr marL="2743200" indent="0">
+              <a:defRPr sz="1100">
+                <a:solidFill>
+                  <a:schemeClr val="lt1"/>
+                </a:solidFill>
+                <a:latin typeface="+mn-lt"/>
+                <a:ea typeface="+mn-ea"/>
+                <a:cs typeface="+mn-cs"/>
+              </a:defRPr>
+            </a:lvl7pPr>
+            <a:lvl8pPr marL="3200400" indent="0">
+              <a:defRPr sz="1100">
+                <a:solidFill>
+                  <a:schemeClr val="lt1"/>
+                </a:solidFill>
+                <a:latin typeface="+mn-lt"/>
+                <a:ea typeface="+mn-ea"/>
+                <a:cs typeface="+mn-cs"/>
+              </a:defRPr>
+            </a:lvl8pPr>
+            <a:lvl9pPr marL="3657600" indent="0">
+              <a:defRPr sz="1100">
+                <a:solidFill>
+                  <a:schemeClr val="lt1"/>
+                </a:solidFill>
+                <a:latin typeface="+mn-lt"/>
+                <a:ea typeface="+mn-ea"/>
+                <a:cs typeface="+mn-cs"/>
+              </a:defRPr>
+            </a:lvl9pPr>
+          </a:lstStyle>
+          <a:p>
+            <a:pPr algn="ctr"/>
+            <a:endParaRPr lang="pt-BR"/>
+          </a:p>
+        </p:txBody>
+      </p:sp>
+      <p:sp>
+        <p:nvSpPr>
+          <p:cNvPr id="9" name="Retângulo de cantos arredondados 8"/>
+          <p:cNvSpPr/>
+          <p:nvPr/>
+        </p:nvSpPr>
+        <p:spPr>
+          <a:xfrm rot="5400000">
+            <a:off x="-607282" y="2616210"/>
+            <a:ext cx="3399382" cy="1047907"/>
+          </a:xfrm>
+          <a:prstGeom prst="roundRect">
+            <a:avLst/>
+          </a:prstGeom>
+          <a:noFill/>
+          <a:ln w="19050">
+            <a:solidFill>
+              <a:srgbClr val="FF0000"/>
+            </a:solidFill>
+            <a:prstDash val="lgDash"/>
+          </a:ln>
+        </p:spPr>
+        <p:style>
+          <a:lnRef idx="2">
+            <a:schemeClr val="accent1">
+              <a:shade val="50000"/>
+            </a:schemeClr>
+          </a:lnRef>
+          <a:fillRef idx="1">
+            <a:schemeClr val="accent1"/>
+          </a:fillRef>
+          <a:effectRef idx="0">
+            <a:schemeClr val="accent1"/>
+          </a:effectRef>
+          <a:fontRef idx="minor">
+            <a:schemeClr val="lt1"/>
+          </a:fontRef>
+        </p:style>
+        <p:txBody>
+          <a:bodyPr rot="0" spcFirstLastPara="0" vert="horz" wrap="square" lIns="91440" tIns="45720" rIns="91440" bIns="45720" numCol="1" spcCol="0" rtlCol="0" fromWordArt="0" anchor="ctr" anchorCtr="0" forceAA="0" compatLnSpc="1">
+            <a:prstTxWarp prst="textNoShape">
+              <a:avLst/>
+            </a:prstTxWarp>
+            <a:noAutofit/>
+          </a:bodyPr>
+          <a:lstStyle>
+            <a:lvl1pPr marL="0" indent="0">
+              <a:defRPr sz="1100">
+                <a:solidFill>
+                  <a:schemeClr val="lt1"/>
+                </a:solidFill>
+                <a:latin typeface="+mn-lt"/>
+                <a:ea typeface="+mn-ea"/>
+                <a:cs typeface="+mn-cs"/>
+              </a:defRPr>
+            </a:lvl1pPr>
+            <a:lvl2pPr marL="457200" indent="0">
+              <a:defRPr sz="1100">
+                <a:solidFill>
+                  <a:schemeClr val="lt1"/>
+                </a:solidFill>
+                <a:latin typeface="+mn-lt"/>
+                <a:ea typeface="+mn-ea"/>
+                <a:cs typeface="+mn-cs"/>
+              </a:defRPr>
+            </a:lvl2pPr>
+            <a:lvl3pPr marL="914400" indent="0">
+              <a:defRPr sz="1100">
+                <a:solidFill>
+                  <a:schemeClr val="lt1"/>
+                </a:solidFill>
+                <a:latin typeface="+mn-lt"/>
+                <a:ea typeface="+mn-ea"/>
+                <a:cs typeface="+mn-cs"/>
+              </a:defRPr>
+            </a:lvl3pPr>
+            <a:lvl4pPr marL="1371600" indent="0">
+              <a:defRPr sz="1100">
+                <a:solidFill>
+                  <a:schemeClr val="lt1"/>
+                </a:solidFill>
+                <a:latin typeface="+mn-lt"/>
+                <a:ea typeface="+mn-ea"/>
+                <a:cs typeface="+mn-cs"/>
+              </a:defRPr>
+            </a:lvl4pPr>
+            <a:lvl5pPr marL="1828800" indent="0">
+              <a:defRPr sz="1100">
+                <a:solidFill>
+                  <a:schemeClr val="lt1"/>
+                </a:solidFill>
+                <a:latin typeface="+mn-lt"/>
+                <a:ea typeface="+mn-ea"/>
+                <a:cs typeface="+mn-cs"/>
+              </a:defRPr>
+            </a:lvl5pPr>
+            <a:lvl6pPr marL="2286000" indent="0">
+              <a:defRPr sz="1100">
+                <a:solidFill>
+                  <a:schemeClr val="lt1"/>
+                </a:solidFill>
+                <a:latin typeface="+mn-lt"/>
+                <a:ea typeface="+mn-ea"/>
+                <a:cs typeface="+mn-cs"/>
+              </a:defRPr>
+            </a:lvl6pPr>
+            <a:lvl7pPr marL="2743200" indent="0">
+              <a:defRPr sz="1100">
+                <a:solidFill>
+                  <a:schemeClr val="lt1"/>
+                </a:solidFill>
+                <a:latin typeface="+mn-lt"/>
+                <a:ea typeface="+mn-ea"/>
+                <a:cs typeface="+mn-cs"/>
+              </a:defRPr>
+            </a:lvl7pPr>
+            <a:lvl8pPr marL="3200400" indent="0">
+              <a:defRPr sz="1100">
+                <a:solidFill>
+                  <a:schemeClr val="lt1"/>
+                </a:solidFill>
+                <a:latin typeface="+mn-lt"/>
+                <a:ea typeface="+mn-ea"/>
+                <a:cs typeface="+mn-cs"/>
+              </a:defRPr>
+            </a:lvl8pPr>
+            <a:lvl9pPr marL="3657600" indent="0">
+              <a:defRPr sz="1100">
+                <a:solidFill>
+                  <a:schemeClr val="lt1"/>
+                </a:solidFill>
+                <a:latin typeface="+mn-lt"/>
+                <a:ea typeface="+mn-ea"/>
+                <a:cs typeface="+mn-cs"/>
+              </a:defRPr>
+            </a:lvl9pPr>
+          </a:lstStyle>
+          <a:p>
+            <a:pPr algn="ctr"/>
+            <a:endParaRPr lang="pt-BR"/>
+          </a:p>
+        </p:txBody>
+      </p:sp>
+      <p:pic>
+        <p:nvPicPr>
+          <p:cNvPr id="11" name="Imagem 10"/>
+          <p:cNvPicPr>
+            <a:picLocks noChangeAspect="1"/>
+          </p:cNvPicPr>
+          <p:nvPr/>
+        </p:nvPicPr>
+        <p:blipFill>
+          <a:blip r:embed="rId4"/>
+          <a:stretch>
+            <a:fillRect/>
+          </a:stretch>
+        </p:blipFill>
+        <p:spPr>
+          <a:xfrm>
+            <a:off x="4553798" y="1440472"/>
+            <a:ext cx="7048862" cy="3048401"/>
+          </a:xfrm>
+          <a:prstGeom prst="rect">
+            <a:avLst/>
+          </a:prstGeom>
+        </p:spPr>
+      </p:pic>
+      <p:sp>
+        <p:nvSpPr>
+          <p:cNvPr id="13" name="Retângulo de cantos arredondados 12"/>
+          <p:cNvSpPr/>
+          <p:nvPr/>
+        </p:nvSpPr>
+        <p:spPr>
+          <a:xfrm rot="5400000">
+            <a:off x="7330863" y="-689871"/>
+            <a:ext cx="1553720" cy="7048863"/>
+          </a:xfrm>
+          <a:prstGeom prst="roundRect">
+            <a:avLst/>
+          </a:prstGeom>
+          <a:noFill/>
+          <a:ln w="19050">
+            <a:solidFill>
+              <a:srgbClr val="FF0000"/>
+            </a:solidFill>
+            <a:prstDash val="lgDash"/>
+          </a:ln>
+        </p:spPr>
+        <p:style>
+          <a:lnRef idx="2">
+            <a:schemeClr val="accent1">
+              <a:shade val="50000"/>
+            </a:schemeClr>
+          </a:lnRef>
+          <a:fillRef idx="1">
+            <a:schemeClr val="accent1"/>
+          </a:fillRef>
+          <a:effectRef idx="0">
+            <a:schemeClr val="accent1"/>
+          </a:effectRef>
+          <a:fontRef idx="minor">
+            <a:schemeClr val="lt1"/>
+          </a:fontRef>
+        </p:style>
+        <p:txBody>
+          <a:bodyPr rot="0" spcFirstLastPara="0" vert="horz" wrap="square" lIns="91440" tIns="45720" rIns="91440" bIns="45720" numCol="1" spcCol="0" rtlCol="0" fromWordArt="0" anchor="ctr" anchorCtr="0" forceAA="0" compatLnSpc="1">
+            <a:prstTxWarp prst="textNoShape">
+              <a:avLst/>
+            </a:prstTxWarp>
+            <a:noAutofit/>
+          </a:bodyPr>
+          <a:lstStyle>
+            <a:lvl1pPr marL="0" indent="0">
+              <a:defRPr sz="1100">
+                <a:solidFill>
+                  <a:schemeClr val="lt1"/>
+                </a:solidFill>
+                <a:latin typeface="+mn-lt"/>
+                <a:ea typeface="+mn-ea"/>
+                <a:cs typeface="+mn-cs"/>
+              </a:defRPr>
+            </a:lvl1pPr>
+            <a:lvl2pPr marL="457200" indent="0">
+              <a:defRPr sz="1100">
+                <a:solidFill>
+                  <a:schemeClr val="lt1"/>
+                </a:solidFill>
+                <a:latin typeface="+mn-lt"/>
+                <a:ea typeface="+mn-ea"/>
+                <a:cs typeface="+mn-cs"/>
+              </a:defRPr>
+            </a:lvl2pPr>
+            <a:lvl3pPr marL="914400" indent="0">
+              <a:defRPr sz="1100">
+                <a:solidFill>
+                  <a:schemeClr val="lt1"/>
+                </a:solidFill>
+                <a:latin typeface="+mn-lt"/>
+                <a:ea typeface="+mn-ea"/>
+                <a:cs typeface="+mn-cs"/>
+              </a:defRPr>
+            </a:lvl3pPr>
+            <a:lvl4pPr marL="1371600" indent="0">
+              <a:defRPr sz="1100">
+                <a:solidFill>
+                  <a:schemeClr val="lt1"/>
+                </a:solidFill>
+                <a:latin typeface="+mn-lt"/>
+                <a:ea typeface="+mn-ea"/>
+                <a:cs typeface="+mn-cs"/>
+              </a:defRPr>
+            </a:lvl4pPr>
+            <a:lvl5pPr marL="1828800" indent="0">
+              <a:defRPr sz="1100">
+                <a:solidFill>
+                  <a:schemeClr val="lt1"/>
+                </a:solidFill>
+                <a:latin typeface="+mn-lt"/>
+                <a:ea typeface="+mn-ea"/>
+                <a:cs typeface="+mn-cs"/>
+              </a:defRPr>
+            </a:lvl5pPr>
+            <a:lvl6pPr marL="2286000" indent="0">
+              <a:defRPr sz="1100">
+                <a:solidFill>
+                  <a:schemeClr val="lt1"/>
+                </a:solidFill>
+                <a:latin typeface="+mn-lt"/>
+                <a:ea typeface="+mn-ea"/>
+                <a:cs typeface="+mn-cs"/>
+              </a:defRPr>
+            </a:lvl6pPr>
+            <a:lvl7pPr marL="2743200" indent="0">
+              <a:defRPr sz="1100">
+                <a:solidFill>
+                  <a:schemeClr val="lt1"/>
+                </a:solidFill>
+                <a:latin typeface="+mn-lt"/>
+                <a:ea typeface="+mn-ea"/>
+                <a:cs typeface="+mn-cs"/>
+              </a:defRPr>
+            </a:lvl7pPr>
+            <a:lvl8pPr marL="3200400" indent="0">
+              <a:defRPr sz="1100">
+                <a:solidFill>
+                  <a:schemeClr val="lt1"/>
+                </a:solidFill>
+                <a:latin typeface="+mn-lt"/>
+                <a:ea typeface="+mn-ea"/>
+                <a:cs typeface="+mn-cs"/>
+              </a:defRPr>
+            </a:lvl8pPr>
+            <a:lvl9pPr marL="3657600" indent="0">
+              <a:defRPr sz="1100">
+                <a:solidFill>
+                  <a:schemeClr val="lt1"/>
+                </a:solidFill>
+                <a:latin typeface="+mn-lt"/>
+                <a:ea typeface="+mn-ea"/>
+                <a:cs typeface="+mn-cs"/>
+              </a:defRPr>
+            </a:lvl9pPr>
+          </a:lstStyle>
+          <a:p>
+            <a:pPr algn="ctr"/>
+            <a:endParaRPr lang="pt-BR"/>
+          </a:p>
+        </p:txBody>
+      </p:sp>
     </p:spTree>
     <p:extLst>
       <p:ext uri="{BB962C8B-B14F-4D97-AF65-F5344CB8AC3E}">
-        <p14:creationId xmlns:p14="http://schemas.microsoft.com/office/powerpoint/2010/main" val="1133217372"/>
+        <p14:creationId xmlns:p14="http://schemas.microsoft.com/office/powerpoint/2010/main" val="1331402785"/>
       </p:ext>
     </p:extLst>
   </p:cSld>

</xml_diff>